<commit_message>
Added new slide for score comparison and updated
Added new slide for score comparison and update BERT
</commit_message>
<xml_diff>
--- a/DataKnights-VideoGameAnalysisWIP2.pptx
+++ b/DataKnights-VideoGameAnalysisWIP2.pptx
@@ -5,7 +5,7 @@
     <p:sldMasterId id="2147483659" r:id="rId1"/>
   </p:sldMasterIdLst>
   <p:notesMasterIdLst>
-    <p:notesMasterId r:id="rId25"/>
+    <p:notesMasterId r:id="rId26"/>
   </p:notesMasterIdLst>
   <p:sldIdLst>
     <p:sldId id="256" r:id="rId2"/>
@@ -30,24 +30,25 @@
     <p:sldId id="274" r:id="rId21"/>
     <p:sldId id="276" r:id="rId22"/>
     <p:sldId id="278" r:id="rId23"/>
-    <p:sldId id="277" r:id="rId24"/>
+    <p:sldId id="279" r:id="rId24"/>
+    <p:sldId id="277" r:id="rId25"/>
   </p:sldIdLst>
   <p:sldSz cx="9144000" cy="5143500" type="screen16x9"/>
   <p:notesSz cx="6858000" cy="9144000"/>
   <p:embeddedFontLst>
     <p:embeddedFont>
       <p:font typeface="Calibri" panose="020F0502020204030204" pitchFamily="34" charset="0"/>
-      <p:regular r:id="rId26"/>
-      <p:bold r:id="rId27"/>
-      <p:italic r:id="rId28"/>
-      <p:boldItalic r:id="rId29"/>
+      <p:regular r:id="rId27"/>
+      <p:bold r:id="rId28"/>
+      <p:italic r:id="rId29"/>
+      <p:boldItalic r:id="rId30"/>
     </p:embeddedFont>
     <p:embeddedFont>
       <p:font typeface="Nunito" pitchFamily="2" charset="0"/>
-      <p:regular r:id="rId30"/>
-      <p:bold r:id="rId31"/>
-      <p:italic r:id="rId32"/>
-      <p:boldItalic r:id="rId33"/>
+      <p:regular r:id="rId31"/>
+      <p:bold r:id="rId32"/>
+      <p:italic r:id="rId33"/>
+      <p:boldItalic r:id="rId34"/>
     </p:embeddedFont>
   </p:embeddedFontLst>
   <p:defaultTextStyle>
@@ -13655,8 +13656,8 @@
         </p:nvSpPr>
         <p:spPr>
           <a:xfrm>
-            <a:off x="504824" y="1052255"/>
-            <a:ext cx="8131969" cy="766763"/>
+            <a:off x="619125" y="1385631"/>
+            <a:ext cx="4695826" cy="2086232"/>
           </a:xfrm>
         </p:spPr>
         <p:txBody>
@@ -13665,11 +13666,55 @@
           <a:p>
             <a:r>
               <a:rPr lang="en-US" dirty="0"/>
-              <a:t>Implementation in progress</a:t>
+              <a:t>BERT pretrained model used to analyze the sentiment for the game reviews. </a:t>
+            </a:r>
+          </a:p>
+          <a:p>
+            <a:endParaRPr lang="en-US" dirty="0"/>
+          </a:p>
+          <a:p>
+            <a:pPr>
+              <a:lnSpc>
+                <a:spcPct val="150000"/>
+              </a:lnSpc>
+            </a:pPr>
+            <a:r>
+              <a:rPr lang="en-US" dirty="0"/>
+              <a:t>Bert score was analyzed to validate the score, it seems that the model worked good for all rating but there are some discrepancies when ,compared with the games with review score 1</a:t>
             </a:r>
           </a:p>
         </p:txBody>
       </p:sp>
+      <p:pic>
+        <p:nvPicPr>
+          <p:cNvPr id="5" name="Picture 4">
+            <a:extLst>
+              <a:ext uri="{FF2B5EF4-FFF2-40B4-BE49-F238E27FC236}">
+                <a16:creationId xmlns:a16="http://schemas.microsoft.com/office/drawing/2014/main" id="{4632E6F0-1B07-4B65-A48C-487812425E52}"/>
+              </a:ext>
+            </a:extLst>
+          </p:cNvPr>
+          <p:cNvPicPr>
+            <a:picLocks noChangeAspect="1"/>
+          </p:cNvPicPr>
+          <p:nvPr/>
+        </p:nvPicPr>
+        <p:blipFill>
+          <a:blip r:embed="rId2"/>
+          <a:stretch>
+            <a:fillRect/>
+          </a:stretch>
+        </p:blipFill>
+        <p:spPr>
+          <a:xfrm>
+            <a:off x="5468537" y="1475056"/>
+            <a:ext cx="3056337" cy="2049135"/>
+          </a:xfrm>
+          <a:prstGeom prst="rect">
+            <a:avLst/>
+          </a:prstGeom>
+        </p:spPr>
+      </p:pic>
     </p:spTree>
     <p:extLst>
       <p:ext uri="{BB962C8B-B14F-4D97-AF65-F5344CB8AC3E}">
@@ -13684,6 +13729,370 @@
 </file>
 
 <file path=ppt/slides/slide23.xml><?xml version="1.0" encoding="utf-8"?>
+<p:sld xmlns:a="http://schemas.openxmlformats.org/drawingml/2006/main" xmlns:r="http://schemas.openxmlformats.org/officeDocument/2006/relationships" xmlns:p="http://schemas.openxmlformats.org/presentationml/2006/main">
+  <p:cSld>
+    <p:spTree>
+      <p:nvGrpSpPr>
+        <p:cNvPr id="1" name=""/>
+        <p:cNvGrpSpPr/>
+        <p:nvPr/>
+      </p:nvGrpSpPr>
+      <p:grpSpPr>
+        <a:xfrm>
+          <a:off x="0" y="0"/>
+          <a:ext cx="0" cy="0"/>
+          <a:chOff x="0" y="0"/>
+          <a:chExt cx="0" cy="0"/>
+        </a:xfrm>
+      </p:grpSpPr>
+      <p:sp>
+        <p:nvSpPr>
+          <p:cNvPr id="2" name="Title 1">
+            <a:extLst>
+              <a:ext uri="{FF2B5EF4-FFF2-40B4-BE49-F238E27FC236}">
+                <a16:creationId xmlns:a16="http://schemas.microsoft.com/office/drawing/2014/main" id="{51EEF532-FDB9-4AA7-B3FD-B3CBAC09CB02}"/>
+              </a:ext>
+            </a:extLst>
+          </p:cNvPr>
+          <p:cNvSpPr>
+            <a:spLocks noGrp="1"/>
+          </p:cNvSpPr>
+          <p:nvPr>
+            <p:ph type="title"/>
+          </p:nvPr>
+        </p:nvSpPr>
+        <p:spPr>
+          <a:xfrm>
+            <a:off x="569113" y="331247"/>
+            <a:ext cx="7505700" cy="611724"/>
+          </a:xfrm>
+        </p:spPr>
+        <p:txBody>
+          <a:bodyPr>
+            <a:normAutofit fontScale="90000"/>
+          </a:bodyPr>
+          <a:lstStyle/>
+          <a:p>
+            <a:r>
+              <a:rPr lang="en-US" dirty="0"/>
+              <a:t>Review Analysis – Score Comparison</a:t>
+            </a:r>
+          </a:p>
+        </p:txBody>
+      </p:sp>
+      <p:sp>
+        <p:nvSpPr>
+          <p:cNvPr id="3" name="Text Placeholder 2">
+            <a:extLst>
+              <a:ext uri="{FF2B5EF4-FFF2-40B4-BE49-F238E27FC236}">
+                <a16:creationId xmlns:a16="http://schemas.microsoft.com/office/drawing/2014/main" id="{F020C05D-3786-4F78-AECB-85DE88364897}"/>
+              </a:ext>
+            </a:extLst>
+          </p:cNvPr>
+          <p:cNvSpPr>
+            <a:spLocks noGrp="1"/>
+          </p:cNvSpPr>
+          <p:nvPr>
+            <p:ph type="body" idx="1"/>
+          </p:nvPr>
+        </p:nvSpPr>
+        <p:spPr>
+          <a:xfrm>
+            <a:off x="569113" y="821523"/>
+            <a:ext cx="7803362" cy="1757363"/>
+          </a:xfrm>
+        </p:spPr>
+        <p:txBody>
+          <a:bodyPr/>
+          <a:lstStyle/>
+          <a:p>
+            <a:pPr>
+              <a:lnSpc>
+                <a:spcPct val="150000"/>
+              </a:lnSpc>
+            </a:pPr>
+            <a:r>
+              <a:rPr lang="en-US" dirty="0"/>
+              <a:t>Based on the image below we see the first 3 reviews are all positive reviews </a:t>
+            </a:r>
+          </a:p>
+          <a:p>
+            <a:pPr>
+              <a:lnSpc>
+                <a:spcPct val="150000"/>
+              </a:lnSpc>
+            </a:pPr>
+            <a:r>
+              <a:rPr lang="en-US" dirty="0"/>
+              <a:t>Based on the scores it seems that Roberta and BERT did better to identify the intensity of positive sentiment where as VADER’s intensity was less</a:t>
+            </a:r>
+          </a:p>
+          <a:p>
+            <a:pPr>
+              <a:lnSpc>
+                <a:spcPct val="150000"/>
+              </a:lnSpc>
+            </a:pPr>
+            <a:r>
+              <a:rPr lang="en-US" dirty="0"/>
+              <a:t>BERT and Roberta seems to be working well to identify sentiment with different parameters </a:t>
+            </a:r>
+          </a:p>
+          <a:p>
+            <a:pPr>
+              <a:lnSpc>
+                <a:spcPct val="150000"/>
+              </a:lnSpc>
+            </a:pPr>
+            <a:r>
+              <a:rPr lang="en-US" dirty="0"/>
+              <a:t>From performance standpoint VADER is much faster when compared with BERT or Roberta</a:t>
+            </a:r>
+          </a:p>
+          <a:p>
+            <a:endParaRPr lang="en-US" dirty="0"/>
+          </a:p>
+        </p:txBody>
+      </p:sp>
+      <p:pic>
+        <p:nvPicPr>
+          <p:cNvPr id="5" name="Picture 4">
+            <a:extLst>
+              <a:ext uri="{FF2B5EF4-FFF2-40B4-BE49-F238E27FC236}">
+                <a16:creationId xmlns:a16="http://schemas.microsoft.com/office/drawing/2014/main" id="{ADF4B8F8-819D-4C5B-B474-C9A5DC36CF9F}"/>
+              </a:ext>
+            </a:extLst>
+          </p:cNvPr>
+          <p:cNvPicPr>
+            <a:picLocks noChangeAspect="1"/>
+          </p:cNvPicPr>
+          <p:nvPr/>
+        </p:nvPicPr>
+        <p:blipFill>
+          <a:blip r:embed="rId2"/>
+          <a:stretch>
+            <a:fillRect/>
+          </a:stretch>
+        </p:blipFill>
+        <p:spPr>
+          <a:xfrm>
+            <a:off x="485782" y="2389839"/>
+            <a:ext cx="8043858" cy="1061589"/>
+          </a:xfrm>
+          <a:prstGeom prst="rect">
+            <a:avLst/>
+          </a:prstGeom>
+        </p:spPr>
+      </p:pic>
+      <p:pic>
+        <p:nvPicPr>
+          <p:cNvPr id="7" name="Picture 6">
+            <a:extLst>
+              <a:ext uri="{FF2B5EF4-FFF2-40B4-BE49-F238E27FC236}">
+                <a16:creationId xmlns:a16="http://schemas.microsoft.com/office/drawing/2014/main" id="{A1F96738-AA33-49E2-8799-0E4DFD5C842B}"/>
+              </a:ext>
+            </a:extLst>
+          </p:cNvPr>
+          <p:cNvPicPr>
+            <a:picLocks noChangeAspect="1"/>
+          </p:cNvPicPr>
+          <p:nvPr/>
+        </p:nvPicPr>
+        <p:blipFill>
+          <a:blip r:embed="rId3"/>
+          <a:stretch>
+            <a:fillRect/>
+          </a:stretch>
+        </p:blipFill>
+        <p:spPr>
+          <a:xfrm>
+            <a:off x="326229" y="3371849"/>
+            <a:ext cx="6991350" cy="485775"/>
+          </a:xfrm>
+          <a:prstGeom prst="rect">
+            <a:avLst/>
+          </a:prstGeom>
+        </p:spPr>
+      </p:pic>
+      <p:pic>
+        <p:nvPicPr>
+          <p:cNvPr id="9" name="Picture 8">
+            <a:extLst>
+              <a:ext uri="{FF2B5EF4-FFF2-40B4-BE49-F238E27FC236}">
+                <a16:creationId xmlns:a16="http://schemas.microsoft.com/office/drawing/2014/main" id="{7EF9B93B-267D-499B-A73D-BD6C828A0383}"/>
+              </a:ext>
+            </a:extLst>
+          </p:cNvPr>
+          <p:cNvPicPr>
+            <a:picLocks noChangeAspect="1"/>
+          </p:cNvPicPr>
+          <p:nvPr/>
+        </p:nvPicPr>
+        <p:blipFill>
+          <a:blip r:embed="rId4"/>
+          <a:stretch>
+            <a:fillRect/>
+          </a:stretch>
+        </p:blipFill>
+        <p:spPr>
+          <a:xfrm>
+            <a:off x="383379" y="3834816"/>
+            <a:ext cx="6877050" cy="409575"/>
+          </a:xfrm>
+          <a:prstGeom prst="rect">
+            <a:avLst/>
+          </a:prstGeom>
+        </p:spPr>
+      </p:pic>
+      <p:pic>
+        <p:nvPicPr>
+          <p:cNvPr id="11" name="Picture 10">
+            <a:extLst>
+              <a:ext uri="{FF2B5EF4-FFF2-40B4-BE49-F238E27FC236}">
+                <a16:creationId xmlns:a16="http://schemas.microsoft.com/office/drawing/2014/main" id="{2192349F-5FA5-453B-A642-3ED9F81B2EBB}"/>
+              </a:ext>
+            </a:extLst>
+          </p:cNvPr>
+          <p:cNvPicPr>
+            <a:picLocks noChangeAspect="1"/>
+          </p:cNvPicPr>
+          <p:nvPr/>
+        </p:nvPicPr>
+        <p:blipFill>
+          <a:blip r:embed="rId5"/>
+          <a:stretch>
+            <a:fillRect/>
+          </a:stretch>
+        </p:blipFill>
+        <p:spPr>
+          <a:xfrm>
+            <a:off x="383379" y="4199154"/>
+            <a:ext cx="6867525" cy="428625"/>
+          </a:xfrm>
+          <a:prstGeom prst="rect">
+            <a:avLst/>
+          </a:prstGeom>
+        </p:spPr>
+      </p:pic>
+      <p:sp>
+        <p:nvSpPr>
+          <p:cNvPr id="12" name="TextBox 11">
+            <a:extLst>
+              <a:ext uri="{FF2B5EF4-FFF2-40B4-BE49-F238E27FC236}">
+                <a16:creationId xmlns:a16="http://schemas.microsoft.com/office/drawing/2014/main" id="{2D4DC05F-EFAB-458F-ABDD-07B16066C413}"/>
+              </a:ext>
+            </a:extLst>
+          </p:cNvPr>
+          <p:cNvSpPr txBox="1"/>
+          <p:nvPr/>
+        </p:nvSpPr>
+        <p:spPr>
+          <a:xfrm>
+            <a:off x="7387586" y="3487148"/>
+            <a:ext cx="1301608" cy="276999"/>
+          </a:xfrm>
+          <a:prstGeom prst="rect">
+            <a:avLst/>
+          </a:prstGeom>
+          <a:noFill/>
+        </p:spPr>
+        <p:txBody>
+          <a:bodyPr wrap="square" rtlCol="0">
+            <a:spAutoFit/>
+          </a:bodyPr>
+          <a:lstStyle/>
+          <a:p>
+            <a:r>
+              <a:rPr lang="en-US" sz="1200" b="1" dirty="0"/>
+              <a:t>VADER</a:t>
+            </a:r>
+          </a:p>
+        </p:txBody>
+      </p:sp>
+      <p:sp>
+        <p:nvSpPr>
+          <p:cNvPr id="13" name="TextBox 12">
+            <a:extLst>
+              <a:ext uri="{FF2B5EF4-FFF2-40B4-BE49-F238E27FC236}">
+                <a16:creationId xmlns:a16="http://schemas.microsoft.com/office/drawing/2014/main" id="{3502DE49-0BCD-4053-B044-2DEAA180790B}"/>
+              </a:ext>
+            </a:extLst>
+          </p:cNvPr>
+          <p:cNvSpPr txBox="1"/>
+          <p:nvPr/>
+        </p:nvSpPr>
+        <p:spPr>
+          <a:xfrm>
+            <a:off x="7418539" y="3882441"/>
+            <a:ext cx="1301608" cy="276999"/>
+          </a:xfrm>
+          <a:prstGeom prst="rect">
+            <a:avLst/>
+          </a:prstGeom>
+          <a:noFill/>
+        </p:spPr>
+        <p:txBody>
+          <a:bodyPr wrap="square" rtlCol="0">
+            <a:spAutoFit/>
+          </a:bodyPr>
+          <a:lstStyle/>
+          <a:p>
+            <a:r>
+              <a:rPr lang="en-US" sz="1200" b="1" dirty="0"/>
+              <a:t>Roberta</a:t>
+            </a:r>
+          </a:p>
+        </p:txBody>
+      </p:sp>
+      <p:sp>
+        <p:nvSpPr>
+          <p:cNvPr id="14" name="TextBox 13">
+            <a:extLst>
+              <a:ext uri="{FF2B5EF4-FFF2-40B4-BE49-F238E27FC236}">
+                <a16:creationId xmlns:a16="http://schemas.microsoft.com/office/drawing/2014/main" id="{D8241E0F-31FD-4FAB-A017-AF48D8033F80}"/>
+              </a:ext>
+            </a:extLst>
+          </p:cNvPr>
+          <p:cNvSpPr txBox="1"/>
+          <p:nvPr/>
+        </p:nvSpPr>
+        <p:spPr>
+          <a:xfrm>
+            <a:off x="7425683" y="4275340"/>
+            <a:ext cx="1301608" cy="276999"/>
+          </a:xfrm>
+          <a:prstGeom prst="rect">
+            <a:avLst/>
+          </a:prstGeom>
+          <a:noFill/>
+        </p:spPr>
+        <p:txBody>
+          <a:bodyPr wrap="square" rtlCol="0">
+            <a:spAutoFit/>
+          </a:bodyPr>
+          <a:lstStyle/>
+          <a:p>
+            <a:r>
+              <a:rPr lang="en-US" sz="1200" b="1" dirty="0"/>
+              <a:t>BERT</a:t>
+            </a:r>
+          </a:p>
+        </p:txBody>
+      </p:sp>
+    </p:spTree>
+    <p:extLst>
+      <p:ext uri="{BB962C8B-B14F-4D97-AF65-F5344CB8AC3E}">
+        <p14:creationId xmlns:p14="http://schemas.microsoft.com/office/powerpoint/2010/main" val="3381594616"/>
+      </p:ext>
+    </p:extLst>
+  </p:cSld>
+  <p:clrMapOvr>
+    <a:masterClrMapping/>
+  </p:clrMapOvr>
+</p:sld>
+</file>
+
+<file path=ppt/slides/slide24.xml><?xml version="1.0" encoding="utf-8"?>
 <p:sld xmlns:a="http://schemas.openxmlformats.org/drawingml/2006/main" xmlns:r="http://schemas.openxmlformats.org/officeDocument/2006/relationships" xmlns:p="http://schemas.openxmlformats.org/presentationml/2006/main">
   <p:cSld>
     <p:spTree>

</xml_diff>

<commit_message>
Updated Presentation with Dashboard
</commit_message>
<xml_diff>
--- a/DataKnights-VideoGameAnalysisWIP2.pptx
+++ b/DataKnights-VideoGameAnalysisWIP2.pptx
@@ -5,7 +5,7 @@
     <p:sldMasterId id="2147483659" r:id="rId1"/>
   </p:sldMasterIdLst>
   <p:notesMasterIdLst>
-    <p:notesMasterId r:id="rId26"/>
+    <p:notesMasterId r:id="rId28"/>
   </p:notesMasterIdLst>
   <p:sldIdLst>
     <p:sldId id="256" r:id="rId2"/>
@@ -32,23 +32,25 @@
     <p:sldId id="278" r:id="rId23"/>
     <p:sldId id="279" r:id="rId24"/>
     <p:sldId id="277" r:id="rId25"/>
+    <p:sldId id="280" r:id="rId26"/>
+    <p:sldId id="281" r:id="rId27"/>
   </p:sldIdLst>
   <p:sldSz cx="9144000" cy="5143500" type="screen16x9"/>
   <p:notesSz cx="6858000" cy="9144000"/>
   <p:embeddedFontLst>
     <p:embeddedFont>
       <p:font typeface="Calibri" panose="020F0502020204030204" pitchFamily="34" charset="0"/>
-      <p:regular r:id="rId27"/>
-      <p:bold r:id="rId28"/>
-      <p:italic r:id="rId29"/>
-      <p:boldItalic r:id="rId30"/>
+      <p:regular r:id="rId29"/>
+      <p:bold r:id="rId30"/>
+      <p:italic r:id="rId31"/>
+      <p:boldItalic r:id="rId32"/>
     </p:embeddedFont>
     <p:embeddedFont>
       <p:font typeface="Nunito" pitchFamily="2" charset="0"/>
-      <p:regular r:id="rId31"/>
-      <p:bold r:id="rId32"/>
-      <p:italic r:id="rId33"/>
-      <p:boldItalic r:id="rId34"/>
+      <p:regular r:id="rId33"/>
+      <p:bold r:id="rId34"/>
+      <p:italic r:id="rId35"/>
+      <p:boldItalic r:id="rId36"/>
     </p:embeddedFont>
   </p:embeddedFontLst>
   <p:defaultTextStyle>
@@ -14237,6 +14239,222 @@
 </p:sld>
 </file>
 
+<file path=ppt/slides/slide25.xml><?xml version="1.0" encoding="utf-8"?>
+<p:sld xmlns:a="http://schemas.openxmlformats.org/drawingml/2006/main" xmlns:r="http://schemas.openxmlformats.org/officeDocument/2006/relationships" xmlns:p="http://schemas.openxmlformats.org/presentationml/2006/main">
+  <p:cSld>
+    <p:spTree>
+      <p:nvGrpSpPr>
+        <p:cNvPr id="1" name=""/>
+        <p:cNvGrpSpPr/>
+        <p:nvPr/>
+      </p:nvGrpSpPr>
+      <p:grpSpPr>
+        <a:xfrm>
+          <a:off x="0" y="0"/>
+          <a:ext cx="0" cy="0"/>
+          <a:chOff x="0" y="0"/>
+          <a:chExt cx="0" cy="0"/>
+        </a:xfrm>
+      </p:grpSpPr>
+      <p:sp>
+        <p:nvSpPr>
+          <p:cNvPr id="2" name="Title 1">
+            <a:extLst>
+              <a:ext uri="{FF2B5EF4-FFF2-40B4-BE49-F238E27FC236}">
+                <a16:creationId xmlns:a16="http://schemas.microsoft.com/office/drawing/2014/main" id="{0164832F-E0EF-4C97-8E59-5A266C12E2E9}"/>
+              </a:ext>
+            </a:extLst>
+          </p:cNvPr>
+          <p:cNvSpPr>
+            <a:spLocks noGrp="1"/>
+          </p:cNvSpPr>
+          <p:nvPr>
+            <p:ph type="title"/>
+          </p:nvPr>
+        </p:nvSpPr>
+        <p:spPr>
+          <a:xfrm>
+            <a:off x="604838" y="338391"/>
+            <a:ext cx="7505700" cy="954600"/>
+          </a:xfrm>
+        </p:spPr>
+        <p:txBody>
+          <a:bodyPr/>
+          <a:lstStyle/>
+          <a:p>
+            <a:r>
+              <a:rPr lang="en-US" dirty="0"/>
+              <a:t>Sentiment Analysis - Dashboard</a:t>
+            </a:r>
+          </a:p>
+        </p:txBody>
+      </p:sp>
+      <p:pic>
+        <p:nvPicPr>
+          <p:cNvPr id="4" name="Picture 3">
+            <a:extLst>
+              <a:ext uri="{FF2B5EF4-FFF2-40B4-BE49-F238E27FC236}">
+                <a16:creationId xmlns:a16="http://schemas.microsoft.com/office/drawing/2014/main" id="{2ABF38E1-6BBD-4339-98C4-4DEBFE0BD361}"/>
+              </a:ext>
+            </a:extLst>
+          </p:cNvPr>
+          <p:cNvPicPr>
+            <a:picLocks noChangeAspect="1"/>
+          </p:cNvPicPr>
+          <p:nvPr/>
+        </p:nvPicPr>
+        <p:blipFill>
+          <a:blip r:embed="rId2"/>
+          <a:stretch>
+            <a:fillRect/>
+          </a:stretch>
+        </p:blipFill>
+        <p:spPr>
+          <a:xfrm>
+            <a:off x="364334" y="846286"/>
+            <a:ext cx="8465344" cy="4001676"/>
+          </a:xfrm>
+          <a:prstGeom prst="rect">
+            <a:avLst/>
+          </a:prstGeom>
+        </p:spPr>
+      </p:pic>
+    </p:spTree>
+    <p:extLst>
+      <p:ext uri="{BB962C8B-B14F-4D97-AF65-F5344CB8AC3E}">
+        <p14:creationId xmlns:p14="http://schemas.microsoft.com/office/powerpoint/2010/main" val="3700249842"/>
+      </p:ext>
+    </p:extLst>
+  </p:cSld>
+  <p:clrMapOvr>
+    <a:masterClrMapping/>
+  </p:clrMapOvr>
+</p:sld>
+</file>
+
+<file path=ppt/slides/slide26.xml><?xml version="1.0" encoding="utf-8"?>
+<p:sld xmlns:a="http://schemas.openxmlformats.org/drawingml/2006/main" xmlns:r="http://schemas.openxmlformats.org/officeDocument/2006/relationships" xmlns:p="http://schemas.openxmlformats.org/presentationml/2006/main">
+  <p:cSld>
+    <p:spTree>
+      <p:nvGrpSpPr>
+        <p:cNvPr id="1" name=""/>
+        <p:cNvGrpSpPr/>
+        <p:nvPr/>
+      </p:nvGrpSpPr>
+      <p:grpSpPr>
+        <a:xfrm>
+          <a:off x="0" y="0"/>
+          <a:ext cx="0" cy="0"/>
+          <a:chOff x="0" y="0"/>
+          <a:chExt cx="0" cy="0"/>
+        </a:xfrm>
+      </p:grpSpPr>
+      <p:sp>
+        <p:nvSpPr>
+          <p:cNvPr id="2" name="Title 1">
+            <a:extLst>
+              <a:ext uri="{FF2B5EF4-FFF2-40B4-BE49-F238E27FC236}">
+                <a16:creationId xmlns:a16="http://schemas.microsoft.com/office/drawing/2014/main" id="{0164832F-E0EF-4C97-8E59-5A266C12E2E9}"/>
+              </a:ext>
+            </a:extLst>
+          </p:cNvPr>
+          <p:cNvSpPr>
+            <a:spLocks noGrp="1"/>
+          </p:cNvSpPr>
+          <p:nvPr>
+            <p:ph type="title"/>
+          </p:nvPr>
+        </p:nvSpPr>
+        <p:spPr>
+          <a:xfrm>
+            <a:off x="604838" y="338391"/>
+            <a:ext cx="7505700" cy="954600"/>
+          </a:xfrm>
+        </p:spPr>
+        <p:txBody>
+          <a:bodyPr/>
+          <a:lstStyle/>
+          <a:p>
+            <a:r>
+              <a:rPr lang="en-US" dirty="0"/>
+              <a:t>Sentiment Analysis – Dashboard(contd.)</a:t>
+            </a:r>
+          </a:p>
+        </p:txBody>
+      </p:sp>
+      <p:pic>
+        <p:nvPicPr>
+          <p:cNvPr id="5" name="Picture 4">
+            <a:extLst>
+              <a:ext uri="{FF2B5EF4-FFF2-40B4-BE49-F238E27FC236}">
+                <a16:creationId xmlns:a16="http://schemas.microsoft.com/office/drawing/2014/main" id="{6B742F9E-3541-4A7D-85A9-87B6FF9276F4}"/>
+              </a:ext>
+            </a:extLst>
+          </p:cNvPr>
+          <p:cNvPicPr>
+            <a:picLocks noChangeAspect="1"/>
+          </p:cNvPicPr>
+          <p:nvPr/>
+        </p:nvPicPr>
+        <p:blipFill>
+          <a:blip r:embed="rId2"/>
+          <a:stretch>
+            <a:fillRect/>
+          </a:stretch>
+        </p:blipFill>
+        <p:spPr>
+          <a:xfrm>
+            <a:off x="340519" y="2484977"/>
+            <a:ext cx="3094968" cy="2320132"/>
+          </a:xfrm>
+          <a:prstGeom prst="rect">
+            <a:avLst/>
+          </a:prstGeom>
+        </p:spPr>
+      </p:pic>
+      <p:pic>
+        <p:nvPicPr>
+          <p:cNvPr id="7" name="Picture 6">
+            <a:extLst>
+              <a:ext uri="{FF2B5EF4-FFF2-40B4-BE49-F238E27FC236}">
+                <a16:creationId xmlns:a16="http://schemas.microsoft.com/office/drawing/2014/main" id="{4AAAEEDE-A52F-4704-9570-9785D6EAED95}"/>
+              </a:ext>
+            </a:extLst>
+          </p:cNvPr>
+          <p:cNvPicPr>
+            <a:picLocks noChangeAspect="1"/>
+          </p:cNvPicPr>
+          <p:nvPr/>
+        </p:nvPicPr>
+        <p:blipFill>
+          <a:blip r:embed="rId3"/>
+          <a:stretch>
+            <a:fillRect/>
+          </a:stretch>
+        </p:blipFill>
+        <p:spPr>
+          <a:xfrm>
+            <a:off x="2549661" y="1037147"/>
+            <a:ext cx="6189958" cy="1991803"/>
+          </a:xfrm>
+          <a:prstGeom prst="rect">
+            <a:avLst/>
+          </a:prstGeom>
+        </p:spPr>
+      </p:pic>
+    </p:spTree>
+    <p:extLst>
+      <p:ext uri="{BB962C8B-B14F-4D97-AF65-F5344CB8AC3E}">
+        <p14:creationId xmlns:p14="http://schemas.microsoft.com/office/powerpoint/2010/main" val="2667266920"/>
+      </p:ext>
+    </p:extLst>
+  </p:cSld>
+  <p:clrMapOvr>
+    <a:masterClrMapping/>
+  </p:clrMapOvr>
+</p:sld>
+</file>
+
 <file path=ppt/slides/slide3.xml><?xml version="1.0" encoding="utf-8"?>
 <p:sld xmlns:a="http://schemas.openxmlformats.org/drawingml/2006/main" xmlns:r="http://schemas.openxmlformats.org/officeDocument/2006/relationships" xmlns:p="http://schemas.openxmlformats.org/presentationml/2006/main">
   <p:cSld>

</xml_diff>